<commit_message>
Denote pharmacists as retail as opposed to hospital.
</commit_message>
<xml_diff>
--- a/doc/design_artifacts/STSILABS-open-fda-user-personas.pptx
+++ b/doc/design_artifacts/STSILABS-open-fda-user-personas.pptx
@@ -275,7 +275,7 @@
             <a:fld id="{34281ED1-3FAE-9C40-97E5-EC95EEB5E3A3}" type="datetimeFigureOut">
               <a:rPr lang="en-US"/>
               <a:pPr/>
-              <a:t>6/18/15</a:t>
+              <a:t>7/1/15</a:t>
             </a:fld>
             <a:endParaRPr lang="en-US" dirty="0"/>
           </a:p>
@@ -468,7 +468,7 @@
             <a:fld id="{181C8072-6169-0143-A8CA-90BB65F6F93F}" type="datetimeFigureOut">
               <a:rPr lang="en-US"/>
               <a:pPr/>
-              <a:t>6/18/15</a:t>
+              <a:t>7/1/15</a:t>
             </a:fld>
             <a:endParaRPr lang="en-US" dirty="0"/>
           </a:p>
@@ -671,7 +671,7 @@
             <a:fld id="{401BB402-5586-CD45-9235-89A423CC1B73}" type="datetimeFigureOut">
               <a:rPr lang="en-US"/>
               <a:pPr/>
-              <a:t>6/18/15</a:t>
+              <a:t>7/1/15</a:t>
             </a:fld>
             <a:endParaRPr lang="en-US" dirty="0"/>
           </a:p>
@@ -864,7 +864,7 @@
             <a:fld id="{6C120DB7-F7E5-B042-BDAA-94088FF2E9DF}" type="datetimeFigureOut">
               <a:rPr lang="en-US"/>
               <a:pPr/>
-              <a:t>6/18/15</a:t>
+              <a:t>7/1/15</a:t>
             </a:fld>
             <a:endParaRPr lang="en-US" dirty="0"/>
           </a:p>
@@ -1079,7 +1079,7 @@
             <a:fld id="{B40176F5-F0D5-1248-BE56-8601FE56679B}" type="datetimeFigureOut">
               <a:rPr lang="en-US"/>
               <a:pPr/>
-              <a:t>6/18/15</a:t>
+              <a:t>7/1/15</a:t>
             </a:fld>
             <a:endParaRPr lang="en-US" dirty="0"/>
           </a:p>
@@ -1390,7 +1390,7 @@
             <a:fld id="{BB7CE8EE-5725-6148-B558-F9DC0BE63E59}" type="datetimeFigureOut">
               <a:rPr lang="en-US"/>
               <a:pPr/>
-              <a:t>6/18/15</a:t>
+              <a:t>7/1/15</a:t>
             </a:fld>
             <a:endParaRPr lang="en-US" dirty="0"/>
           </a:p>
@@ -1840,7 +1840,7 @@
             <a:fld id="{97B7EE12-3BD1-054A-9C0A-D80FF44FF964}" type="datetimeFigureOut">
               <a:rPr lang="en-US"/>
               <a:pPr/>
-              <a:t>6/18/15</a:t>
+              <a:t>7/1/15</a:t>
             </a:fld>
             <a:endParaRPr lang="en-US" dirty="0"/>
           </a:p>
@@ -1981,7 +1981,7 @@
             <a:fld id="{7763BD31-D28A-E04C-A06F-368805357A3A}" type="datetimeFigureOut">
               <a:rPr lang="en-US"/>
               <a:pPr/>
-              <a:t>6/18/15</a:t>
+              <a:t>7/1/15</a:t>
             </a:fld>
             <a:endParaRPr lang="en-US" dirty="0"/>
           </a:p>
@@ -2099,7 +2099,7 @@
             <a:fld id="{A3132ADE-E10D-834C-8D5A-976CF51235CD}" type="datetimeFigureOut">
               <a:rPr lang="en-US"/>
               <a:pPr/>
-              <a:t>6/18/15</a:t>
+              <a:t>7/1/15</a:t>
             </a:fld>
             <a:endParaRPr lang="en-US" dirty="0"/>
           </a:p>
@@ -2399,7 +2399,7 @@
             <a:fld id="{7B1419B9-8B62-3348-AAC3-3346CAE8392B}" type="datetimeFigureOut">
               <a:rPr lang="en-US"/>
               <a:pPr/>
-              <a:t>6/18/15</a:t>
+              <a:t>7/1/15</a:t>
             </a:fld>
             <a:endParaRPr lang="en-US" dirty="0"/>
           </a:p>
@@ -2679,7 +2679,7 @@
             <a:fld id="{00213446-AC86-DA4B-829F-980BFFC33998}" type="datetimeFigureOut">
               <a:rPr lang="en-US"/>
               <a:pPr/>
-              <a:t>6/18/15</a:t>
+              <a:t>7/1/15</a:t>
             </a:fld>
             <a:endParaRPr lang="en-US" dirty="0"/>
           </a:p>
@@ -3066,7 +3066,7 @@
             <a:fld id="{3F28C513-4E58-2F4B-9144-CC51660DC9DE}" type="datetimeFigureOut">
               <a:rPr lang="en-US"/>
               <a:pPr/>
-              <a:t>6/18/15</a:t>
+              <a:t>7/1/15</a:t>
             </a:fld>
             <a:endParaRPr lang="en-US" dirty="0"/>
           </a:p>
@@ -4090,8 +4090,17 @@
                 <a:ea typeface="ＭＳ Ｐゴシック" charset="0"/>
                 <a:cs typeface="Arial Unicode MS" charset="0"/>
               </a:rPr>
-              <a:t>Pharmacist</a:t>
-            </a:r>
+              <a:t>Pharmacist, Retail</a:t>
+            </a:r>
+            <a:endParaRPr kumimoji="0" lang="en-US" sz="1800" b="1" i="0" u="none" strike="noStrike" cap="none" normalizeH="0" baseline="0" dirty="0" smtClean="0">
+              <a:ln>
+                <a:noFill/>
+              </a:ln>
+              <a:effectLst/>
+              <a:latin typeface="Arial" charset="0"/>
+              <a:ea typeface="ＭＳ Ｐゴシック" charset="0"/>
+              <a:cs typeface="Arial Unicode MS" charset="0"/>
+            </a:endParaRPr>
           </a:p>
           <a:p>
             <a:pPr defTabSz="457200" hangingPunct="0">
@@ -4244,13 +4253,7 @@
               <a:rPr lang="en-US" b="1" dirty="0" smtClean="0">
                 <a:cs typeface="Arial Unicode MS" charset="0"/>
               </a:rPr>
-              <a:t>Pharma</a:t>
-            </a:r>
-            <a:r>
-              <a:rPr lang="en-US" b="1" dirty="0" smtClean="0">
-                <a:cs typeface="Arial Unicode MS" charset="0"/>
-              </a:rPr>
-              <a:t>. Software</a:t>
+              <a:t>Pharma. Software</a:t>
             </a:r>
           </a:p>
           <a:p>
@@ -4351,11 +4354,7 @@
           <a:p>
             <a:r>
               <a:rPr lang="en-US" dirty="0" smtClean="0"/>
-              <a:t>Professional Pharmacist </a:t>
-            </a:r>
-            <a:r>
-              <a:rPr lang="en-US" dirty="0" smtClean="0"/>
-              <a:t>Philippa</a:t>
+              <a:t>Professional Pharmacist Philippa</a:t>
             </a:r>
             <a:endParaRPr lang="en-US" dirty="0"/>
           </a:p>
@@ -5248,18 +5247,6 @@
               </a:rPr>
               <a:t>Contact</a:t>
             </a:r>
-            <a:endParaRPr kumimoji="0" lang="en-US" sz="1400" b="1" i="0" u="none" strike="noStrike" cap="none" normalizeH="0" baseline="0" dirty="0" smtClean="0">
-              <a:ln>
-                <a:noFill/>
-              </a:ln>
-              <a:solidFill>
-                <a:schemeClr val="bg1"/>
-              </a:solidFill>
-              <a:effectLst/>
-              <a:latin typeface="Arial" charset="0"/>
-              <a:ea typeface="ＭＳ Ｐゴシック" charset="0"/>
-              <a:cs typeface="Arial Unicode MS" charset="0"/>
-            </a:endParaRPr>
           </a:p>
           <a:p>
             <a:pPr marL="0" marR="0" indent="0" algn="ctr" defTabSz="457200" rtl="0" eaLnBrk="1" fontAlgn="base" latinLnBrk="0" hangingPunct="0">
@@ -7488,9 +7475,6 @@
               </a:rPr>
               <a:t>NPR</a:t>
             </a:r>
-            <a:endParaRPr lang="en-US" b="1" dirty="0" smtClean="0">
-              <a:cs typeface="Arial Unicode MS" charset="0"/>
-            </a:endParaRPr>
           </a:p>
           <a:p>
             <a:pPr marL="285750" marR="0" indent="-285750" algn="l" defTabSz="457200" rtl="0" eaLnBrk="1" fontAlgn="base" latinLnBrk="0" hangingPunct="0">
@@ -7829,15 +7813,7 @@
           <a:p>
             <a:r>
               <a:rPr lang="en-US" dirty="0" smtClean="0"/>
-              <a:t>I am the primary care-giver for my mother who lives with </a:t>
-            </a:r>
-            <a:r>
-              <a:rPr lang="en-US" dirty="0" smtClean="0"/>
-              <a:t>me, my wife and two teenage children. </a:t>
-            </a:r>
-            <a:r>
-              <a:rPr lang="en-US" dirty="0" smtClean="0"/>
-              <a:t>I have to keep track of her medications and ensure she takes them all. That can be difficult, given the number of medications she takes weekly.</a:t>
+              <a:t>I am the primary care-giver for my mother who lives with me, my wife and two teenage children. I have to keep track of her medications and ensure she takes them all. That can be difficult, given the number of medications she takes weekly.</a:t>
             </a:r>
             <a:endParaRPr lang="en-US" dirty="0"/>
           </a:p>
@@ -7885,11 +7861,7 @@
           <a:p>
             <a:r>
               <a:rPr lang="en-US" b="1" dirty="0" smtClean="0"/>
-              <a:t>48 | MARRIED | ONE OF 3 KIDS| </a:t>
-            </a:r>
-            <a:r>
-              <a:rPr lang="en-US" b="1" dirty="0" smtClean="0"/>
-              <a:t>VETERAN</a:t>
+              <a:t>48 | MARRIED | ONE OF 3 KIDS| VETERAN</a:t>
             </a:r>
             <a:endParaRPr lang="en-US" b="1" dirty="0"/>
           </a:p>

</xml_diff>